<commit_message>
Update Yearn partnership metrics with comprehensive vault data
Updated both Legion and MetaDAO pitch decks with complete Yearn TVL data:
- Increased TVL from $804M to $965.92M (33 unique vaults)
- Updated vault count from 18 to 33 battle-tested vaults
- Reflects deduplication analysis of PowerGlove data

Changes:
- Vibe_Vault_Legion_Pitch_Deck.md: Updated Slide 10 partnership metrics
- MetaDAO_ICO_Proposal_Vibe_Vault.md: Updated Section 7 partnership metrics
- Regenerated Vibe_Vault_Legion_Pitch_Deck.pptx with new data

🤖 Generated with [Claude Code](https://claude.com/claude-code)

Co-Authored-By: Claude <noreply@anthropic.com>
</commit_message>
<xml_diff>
--- a/docs/Vibe_Vault_Legion_Pitch_Deck.pptx
+++ b/docs/Vibe_Vault_Legion_Pitch_Deck.pptx
@@ -3367,7 +3367,7 @@
             </a:r>
             <a:r>
               <a:rPr/>
-              <a:t> ($804M+ TVL) and </a:t>
+              <a:t> ($965M+ TVL) and </a:t>
             </a:r>
             <a:r>
               <a:rPr b="1"/>
@@ -3457,7 +3457,7 @@
             </a:r>
             <a:r>
               <a:rPr/>
-              <a:t> - Create custom Yearn strategies without coding - Charge your own management fees (you become the vault operator) - Access $804M+ Yearn ecosystem TVL and proven strategies - Deploy in minutes vs. months of traditional development</a:t>
+              <a:t> - Create custom Yearn strategies without coding - Charge your own management fees (you become the vault operator) - Access $965M+ Yearn ecosystem TVL and proven strategies - Deploy in minutes vs. months of traditional development</a:t>
             </a:r>
           </a:p>
           <a:p>
@@ -3499,7 +3499,7 @@
             </a:r>
             <a:r>
               <a:rPr/>
-              <a:t> Partnership with #1 DeFi yield aggregator ($804M+ TVL) - </a:t>
+              <a:t> Partnership with #1 DeFi yield aggregator ($965M+ TVL) - </a:t>
             </a:r>
             <a:r>
               <a:rPr b="1"/>
@@ -3515,7 +3515,7 @@
             </a:r>
             <a:r>
               <a:rPr/>
-              <a:t> 18 battle-tested vaults to template and compose</a:t>
+              <a:t> 33 battle-tested vaults to template and compose</a:t>
             </a:r>
           </a:p>
           <a:p>
@@ -3558,7 +3558,7 @@
             </a:r>
             <a:r>
               <a:rPr b="1"/>
-              <a:t>18 Yearn Vaults</a:t>
+              <a:t>33 Yearn Vaults</a:t>
             </a:r>
             <a:r>
               <a:rPr/>
@@ -3566,7 +3566,7 @@
             </a:r>
             <a:r>
               <a:rPr b="1"/>
-              <a:t>$804.21M TVL</a:t>
+              <a:t>$965.92M TVL</a:t>
             </a:r>
             <a:r>
               <a:rPr/>

</xml_diff>